<commit_message>
added plot titles to megahit syntracker
</commit_message>
<xml_diff>
--- a/pangenomicsAnalysis/pangenomics lab notebook.pptx
+++ b/pangenomicsAnalysis/pangenomics lab notebook.pptx
@@ -7,6 +7,10 @@
   <p:sldIdLst>
     <p:sldId id="256" r:id="rId2"/>
     <p:sldId id="257" r:id="rId3"/>
+    <p:sldId id="258" r:id="rId4"/>
+    <p:sldId id="259" r:id="rId5"/>
+    <p:sldId id="260" r:id="rId6"/>
+    <p:sldId id="261" r:id="rId7"/>
   </p:sldIdLst>
   <p:sldSz cx="12192000" cy="6858000"/>
   <p:notesSz cx="6858000" cy="9144000"/>
@@ -105,6 +109,11 @@
       </a:defRPr>
     </a:lvl9pPr>
   </p:defaultTextStyle>
+  <p:extLst>
+    <p:ext uri="{EFAFB233-063F-42B5-8137-9DF3F51BA10A}">
+      <p15:sldGuideLst xmlns:p15="http://schemas.microsoft.com/office/powerpoint/2012/main"/>
+    </p:ext>
+  </p:extLst>
 </p:presentation>
 </file>
 
@@ -255,7 +264,7 @@
           <a:p>
             <a:fld id="{69E6EA1C-E22D-EB40-AF7D-8383356684D2}" type="datetimeFigureOut">
               <a:rPr lang="en-US" smtClean="0"/>
-              <a:t>1/2/25</a:t>
+              <a:t>1/8/25</a:t>
             </a:fld>
             <a:endParaRPr lang="en-US"/>
           </a:p>
@@ -453,7 +462,7 @@
           <a:p>
             <a:fld id="{69E6EA1C-E22D-EB40-AF7D-8383356684D2}" type="datetimeFigureOut">
               <a:rPr lang="en-US" smtClean="0"/>
-              <a:t>1/2/25</a:t>
+              <a:t>1/8/25</a:t>
             </a:fld>
             <a:endParaRPr lang="en-US"/>
           </a:p>
@@ -661,7 +670,7 @@
           <a:p>
             <a:fld id="{69E6EA1C-E22D-EB40-AF7D-8383356684D2}" type="datetimeFigureOut">
               <a:rPr lang="en-US" smtClean="0"/>
-              <a:t>1/2/25</a:t>
+              <a:t>1/8/25</a:t>
             </a:fld>
             <a:endParaRPr lang="en-US"/>
           </a:p>
@@ -859,7 +868,7 @@
           <a:p>
             <a:fld id="{69E6EA1C-E22D-EB40-AF7D-8383356684D2}" type="datetimeFigureOut">
               <a:rPr lang="en-US" smtClean="0"/>
-              <a:t>1/2/25</a:t>
+              <a:t>1/8/25</a:t>
             </a:fld>
             <a:endParaRPr lang="en-US"/>
           </a:p>
@@ -1134,7 +1143,7 @@
           <a:p>
             <a:fld id="{69E6EA1C-E22D-EB40-AF7D-8383356684D2}" type="datetimeFigureOut">
               <a:rPr lang="en-US" smtClean="0"/>
-              <a:t>1/2/25</a:t>
+              <a:t>1/8/25</a:t>
             </a:fld>
             <a:endParaRPr lang="en-US"/>
           </a:p>
@@ -1399,7 +1408,7 @@
           <a:p>
             <a:fld id="{69E6EA1C-E22D-EB40-AF7D-8383356684D2}" type="datetimeFigureOut">
               <a:rPr lang="en-US" smtClean="0"/>
-              <a:t>1/2/25</a:t>
+              <a:t>1/8/25</a:t>
             </a:fld>
             <a:endParaRPr lang="en-US"/>
           </a:p>
@@ -1811,7 +1820,7 @@
           <a:p>
             <a:fld id="{69E6EA1C-E22D-EB40-AF7D-8383356684D2}" type="datetimeFigureOut">
               <a:rPr lang="en-US" smtClean="0"/>
-              <a:t>1/2/25</a:t>
+              <a:t>1/8/25</a:t>
             </a:fld>
             <a:endParaRPr lang="en-US"/>
           </a:p>
@@ -1952,7 +1961,7 @@
           <a:p>
             <a:fld id="{69E6EA1C-E22D-EB40-AF7D-8383356684D2}" type="datetimeFigureOut">
               <a:rPr lang="en-US" smtClean="0"/>
-              <a:t>1/2/25</a:t>
+              <a:t>1/8/25</a:t>
             </a:fld>
             <a:endParaRPr lang="en-US"/>
           </a:p>
@@ -2065,7 +2074,7 @@
           <a:p>
             <a:fld id="{69E6EA1C-E22D-EB40-AF7D-8383356684D2}" type="datetimeFigureOut">
               <a:rPr lang="en-US" smtClean="0"/>
-              <a:t>1/2/25</a:t>
+              <a:t>1/8/25</a:t>
             </a:fld>
             <a:endParaRPr lang="en-US"/>
           </a:p>
@@ -2376,7 +2385,7 @@
           <a:p>
             <a:fld id="{69E6EA1C-E22D-EB40-AF7D-8383356684D2}" type="datetimeFigureOut">
               <a:rPr lang="en-US" smtClean="0"/>
-              <a:t>1/2/25</a:t>
+              <a:t>1/8/25</a:t>
             </a:fld>
             <a:endParaRPr lang="en-US"/>
           </a:p>
@@ -2664,7 +2673,7 @@
           <a:p>
             <a:fld id="{69E6EA1C-E22D-EB40-AF7D-8383356684D2}" type="datetimeFigureOut">
               <a:rPr lang="en-US" smtClean="0"/>
-              <a:t>1/2/25</a:t>
+              <a:t>1/8/25</a:t>
             </a:fld>
             <a:endParaRPr lang="en-US"/>
           </a:p>
@@ -2905,7 +2914,7 @@
           <a:p>
             <a:fld id="{69E6EA1C-E22D-EB40-AF7D-8383356684D2}" type="datetimeFigureOut">
               <a:rPr lang="en-US" smtClean="0"/>
-              <a:t>1/2/25</a:t>
+              <a:t>1/8/25</a:t>
             </a:fld>
             <a:endParaRPr lang="en-US"/>
           </a:p>
@@ -3511,6 +3520,481 @@
     <p:extLst>
       <p:ext uri="{BB962C8B-B14F-4D97-AF65-F5344CB8AC3E}">
         <p14:creationId xmlns:p14="http://schemas.microsoft.com/office/powerpoint/2010/main" val="3304844826"/>
+      </p:ext>
+    </p:extLst>
+  </p:cSld>
+  <p:clrMapOvr>
+    <a:masterClrMapping/>
+  </p:clrMapOvr>
+</p:sld>
+</file>
+
+<file path=ppt/slides/slide3.xml><?xml version="1.0" encoding="utf-8"?>
+<p:sld xmlns:a="http://schemas.openxmlformats.org/drawingml/2006/main" xmlns:r="http://schemas.openxmlformats.org/officeDocument/2006/relationships" xmlns:p="http://schemas.openxmlformats.org/presentationml/2006/main">
+  <p:cSld>
+    <p:spTree>
+      <p:nvGrpSpPr>
+        <p:cNvPr id="1" name=""/>
+        <p:cNvGrpSpPr/>
+        <p:nvPr/>
+      </p:nvGrpSpPr>
+      <p:grpSpPr>
+        <a:xfrm>
+          <a:off x="0" y="0"/>
+          <a:ext cx="0" cy="0"/>
+          <a:chOff x="0" y="0"/>
+          <a:chExt cx="0" cy="0"/>
+        </a:xfrm>
+      </p:grpSpPr>
+      <p:sp>
+        <p:nvSpPr>
+          <p:cNvPr id="2" name="Title 1">
+            <a:extLst>
+              <a:ext uri="{FF2B5EF4-FFF2-40B4-BE49-F238E27FC236}">
+                <a16:creationId xmlns:a16="http://schemas.microsoft.com/office/drawing/2014/main" id="{126EE301-E33E-294A-F80F-35E13D39BC2A}"/>
+              </a:ext>
+            </a:extLst>
+          </p:cNvPr>
+          <p:cNvSpPr>
+            <a:spLocks noGrp="1"/>
+          </p:cNvSpPr>
+          <p:nvPr>
+            <p:ph type="title"/>
+          </p:nvPr>
+        </p:nvSpPr>
+        <p:spPr/>
+        <p:txBody>
+          <a:bodyPr/>
+          <a:lstStyle/>
+          <a:p>
+            <a:r>
+              <a:rPr lang="en-US" dirty="0"/>
+              <a:t>Megahit binning</a:t>
+            </a:r>
+          </a:p>
+        </p:txBody>
+      </p:sp>
+      <p:sp>
+        <p:nvSpPr>
+          <p:cNvPr id="3" name="Content Placeholder 2">
+            <a:extLst>
+              <a:ext uri="{FF2B5EF4-FFF2-40B4-BE49-F238E27FC236}">
+                <a16:creationId xmlns:a16="http://schemas.microsoft.com/office/drawing/2014/main" id="{133031C1-1351-67E6-8D30-154477F17C4D}"/>
+              </a:ext>
+            </a:extLst>
+          </p:cNvPr>
+          <p:cNvSpPr>
+            <a:spLocks noGrp="1"/>
+          </p:cNvSpPr>
+          <p:nvPr>
+            <p:ph idx="1"/>
+          </p:nvPr>
+        </p:nvSpPr>
+        <p:spPr/>
+        <p:txBody>
+          <a:bodyPr/>
+          <a:lstStyle/>
+          <a:p>
+            <a:r>
+              <a:rPr lang="en-US" dirty="0"/>
+              <a:t>Weird results here, got several bins for each sample. For the most part, each bin was too small to be a good assembly of b. breve. In most samples all the bins added together would be about the size of genome we want. </a:t>
+            </a:r>
+          </a:p>
+          <a:p>
+            <a:endParaRPr lang="en-US" dirty="0"/>
+          </a:p>
+          <a:p>
+            <a:r>
+              <a:rPr lang="en-US" dirty="0"/>
+              <a:t>Redid the workflow using spades, which is more memory intensive but known to give longer assemblies. </a:t>
+            </a:r>
+          </a:p>
+        </p:txBody>
+      </p:sp>
+    </p:spTree>
+    <p:extLst>
+      <p:ext uri="{BB962C8B-B14F-4D97-AF65-F5344CB8AC3E}">
+        <p14:creationId xmlns:p14="http://schemas.microsoft.com/office/powerpoint/2010/main" val="2424648642"/>
+      </p:ext>
+    </p:extLst>
+  </p:cSld>
+  <p:clrMapOvr>
+    <a:masterClrMapping/>
+  </p:clrMapOvr>
+</p:sld>
+</file>
+
+<file path=ppt/slides/slide4.xml><?xml version="1.0" encoding="utf-8"?>
+<p:sld xmlns:a="http://schemas.openxmlformats.org/drawingml/2006/main" xmlns:r="http://schemas.openxmlformats.org/officeDocument/2006/relationships" xmlns:p="http://schemas.openxmlformats.org/presentationml/2006/main">
+  <p:cSld>
+    <p:spTree>
+      <p:nvGrpSpPr>
+        <p:cNvPr id="1" name=""/>
+        <p:cNvGrpSpPr/>
+        <p:nvPr/>
+      </p:nvGrpSpPr>
+      <p:grpSpPr>
+        <a:xfrm>
+          <a:off x="0" y="0"/>
+          <a:ext cx="0" cy="0"/>
+          <a:chOff x="0" y="0"/>
+          <a:chExt cx="0" cy="0"/>
+        </a:xfrm>
+      </p:grpSpPr>
+      <p:sp>
+        <p:nvSpPr>
+          <p:cNvPr id="2" name="Title 1">
+            <a:extLst>
+              <a:ext uri="{FF2B5EF4-FFF2-40B4-BE49-F238E27FC236}">
+                <a16:creationId xmlns:a16="http://schemas.microsoft.com/office/drawing/2014/main" id="{92B569B4-76E2-6B04-3489-E68BB19F631E}"/>
+              </a:ext>
+            </a:extLst>
+          </p:cNvPr>
+          <p:cNvSpPr>
+            <a:spLocks noGrp="1"/>
+          </p:cNvSpPr>
+          <p:nvPr>
+            <p:ph type="title"/>
+          </p:nvPr>
+        </p:nvSpPr>
+        <p:spPr/>
+        <p:txBody>
+          <a:bodyPr/>
+          <a:lstStyle/>
+          <a:p>
+            <a:r>
+              <a:rPr lang="en-US" dirty="0"/>
+              <a:t>Spades binning </a:t>
+            </a:r>
+          </a:p>
+        </p:txBody>
+      </p:sp>
+      <p:sp>
+        <p:nvSpPr>
+          <p:cNvPr id="3" name="Content Placeholder 2">
+            <a:extLst>
+              <a:ext uri="{FF2B5EF4-FFF2-40B4-BE49-F238E27FC236}">
+                <a16:creationId xmlns:a16="http://schemas.microsoft.com/office/drawing/2014/main" id="{02BE0D79-B127-A532-8A42-C25DF826D575}"/>
+              </a:ext>
+            </a:extLst>
+          </p:cNvPr>
+          <p:cNvSpPr>
+            <a:spLocks noGrp="1"/>
+          </p:cNvSpPr>
+          <p:nvPr>
+            <p:ph idx="1"/>
+          </p:nvPr>
+        </p:nvSpPr>
+        <p:spPr/>
+        <p:txBody>
+          <a:bodyPr/>
+          <a:lstStyle/>
+          <a:p>
+            <a:r>
+              <a:rPr lang="en-US" dirty="0"/>
+              <a:t>Resulted in generally shorter and bins with no taxonomic classifications (generally worse than megahit). I think I might rerun with the </a:t>
+            </a:r>
+            <a:r>
+              <a:rPr lang="en-US" dirty="0" err="1"/>
+              <a:t>scaffolds.fa</a:t>
+            </a:r>
+            <a:r>
+              <a:rPr lang="en-US" dirty="0"/>
+              <a:t> output. Though I am not sure if this is the proper input. The documentation on spades says it is the primary down stream output, but most forum posts,</a:t>
+            </a:r>
+            <a:r>
+              <a:rPr lang="en-US" dirty="0">
+                <a:hlinkClick r:id="rId2"/>
+              </a:rPr>
+              <a:t> i.e.</a:t>
+            </a:r>
+            <a:r>
+              <a:rPr lang="en-US" dirty="0"/>
+              <a:t> use contigs. </a:t>
+            </a:r>
+            <a:r>
+              <a:rPr lang="en-US" dirty="0" err="1"/>
+              <a:t>Anvio</a:t>
+            </a:r>
+            <a:r>
+              <a:rPr lang="en-US" dirty="0"/>
+              <a:t> mg workflow also uses contigs by default but states one can use the scaffolds. </a:t>
+            </a:r>
+          </a:p>
+          <a:p>
+            <a:r>
+              <a:rPr lang="en-US" dirty="0"/>
+              <a:t>Ran concoct on the contigs from spades and they did not look good at all. Might be because </a:t>
+            </a:r>
+            <a:r>
+              <a:rPr lang="en-US" dirty="0" err="1"/>
+              <a:t>landon</a:t>
+            </a:r>
+            <a:r>
+              <a:rPr lang="en-US" dirty="0"/>
+              <a:t> did it wrong, not sure. </a:t>
+            </a:r>
+          </a:p>
+          <a:p>
+            <a:endParaRPr lang="en-US" dirty="0"/>
+          </a:p>
+        </p:txBody>
+      </p:sp>
+    </p:spTree>
+    <p:extLst>
+      <p:ext uri="{BB962C8B-B14F-4D97-AF65-F5344CB8AC3E}">
+        <p14:creationId xmlns:p14="http://schemas.microsoft.com/office/powerpoint/2010/main" val="1988669944"/>
+      </p:ext>
+    </p:extLst>
+  </p:cSld>
+  <p:clrMapOvr>
+    <a:masterClrMapping/>
+  </p:clrMapOvr>
+</p:sld>
+</file>
+
+<file path=ppt/slides/slide5.xml><?xml version="1.0" encoding="utf-8"?>
+<p:sld xmlns:a="http://schemas.openxmlformats.org/drawingml/2006/main" xmlns:r="http://schemas.openxmlformats.org/officeDocument/2006/relationships" xmlns:p="http://schemas.openxmlformats.org/presentationml/2006/main">
+  <p:cSld>
+    <p:spTree>
+      <p:nvGrpSpPr>
+        <p:cNvPr id="1" name=""/>
+        <p:cNvGrpSpPr/>
+        <p:nvPr/>
+      </p:nvGrpSpPr>
+      <p:grpSpPr>
+        <a:xfrm>
+          <a:off x="0" y="0"/>
+          <a:ext cx="0" cy="0"/>
+          <a:chOff x="0" y="0"/>
+          <a:chExt cx="0" cy="0"/>
+        </a:xfrm>
+      </p:grpSpPr>
+      <p:sp>
+        <p:nvSpPr>
+          <p:cNvPr id="2" name="Title 1">
+            <a:extLst>
+              <a:ext uri="{FF2B5EF4-FFF2-40B4-BE49-F238E27FC236}">
+                <a16:creationId xmlns:a16="http://schemas.microsoft.com/office/drawing/2014/main" id="{BB767A4E-1018-3A6C-CF9D-E06404BB3FF1}"/>
+              </a:ext>
+            </a:extLst>
+          </p:cNvPr>
+          <p:cNvSpPr>
+            <a:spLocks noGrp="1"/>
+          </p:cNvSpPr>
+          <p:nvPr>
+            <p:ph type="title"/>
+          </p:nvPr>
+        </p:nvSpPr>
+        <p:spPr/>
+        <p:txBody>
+          <a:bodyPr/>
+          <a:lstStyle/>
+          <a:p>
+            <a:r>
+              <a:rPr lang="en-US" dirty="0"/>
+              <a:t>Enrichments in spades assemblies </a:t>
+            </a:r>
+          </a:p>
+        </p:txBody>
+      </p:sp>
+      <p:sp>
+        <p:nvSpPr>
+          <p:cNvPr id="3" name="Content Placeholder 2">
+            <a:extLst>
+              <a:ext uri="{FF2B5EF4-FFF2-40B4-BE49-F238E27FC236}">
+                <a16:creationId xmlns:a16="http://schemas.microsoft.com/office/drawing/2014/main" id="{985849EC-472E-5B3F-A948-366CAED7F2EA}"/>
+              </a:ext>
+            </a:extLst>
+          </p:cNvPr>
+          <p:cNvSpPr>
+            <a:spLocks noGrp="1"/>
+          </p:cNvSpPr>
+          <p:nvPr>
+            <p:ph idx="1"/>
+          </p:nvPr>
+        </p:nvSpPr>
+        <p:spPr/>
+        <p:txBody>
+          <a:bodyPr/>
+          <a:lstStyle/>
+          <a:p>
+            <a:r>
+              <a:rPr lang="en-US" dirty="0"/>
+              <a:t>No enriched </a:t>
+            </a:r>
+            <a:r>
+              <a:rPr lang="en-US" dirty="0" err="1"/>
+              <a:t>kofams</a:t>
+            </a:r>
+            <a:r>
+              <a:rPr lang="en-US" dirty="0"/>
+              <a:t> or </a:t>
+            </a:r>
+            <a:r>
+              <a:rPr lang="en-US" dirty="0" err="1"/>
+              <a:t>pfams</a:t>
+            </a:r>
+            <a:r>
+              <a:rPr lang="en-US" dirty="0"/>
+              <a:t> in the </a:t>
+            </a:r>
+            <a:r>
+              <a:rPr lang="en-US"/>
+              <a:t>spades assembly q</a:t>
+            </a:r>
+          </a:p>
+        </p:txBody>
+      </p:sp>
+    </p:spTree>
+    <p:extLst>
+      <p:ext uri="{BB962C8B-B14F-4D97-AF65-F5344CB8AC3E}">
+        <p14:creationId xmlns:p14="http://schemas.microsoft.com/office/powerpoint/2010/main" val="2936303620"/>
+      </p:ext>
+    </p:extLst>
+  </p:cSld>
+  <p:clrMapOvr>
+    <a:masterClrMapping/>
+  </p:clrMapOvr>
+</p:sld>
+</file>
+
+<file path=ppt/slides/slide6.xml><?xml version="1.0" encoding="utf-8"?>
+<p:sld xmlns:a="http://schemas.openxmlformats.org/drawingml/2006/main" xmlns:r="http://schemas.openxmlformats.org/officeDocument/2006/relationships" xmlns:p="http://schemas.openxmlformats.org/presentationml/2006/main">
+  <p:cSld>
+    <p:spTree>
+      <p:nvGrpSpPr>
+        <p:cNvPr id="1" name=""/>
+        <p:cNvGrpSpPr/>
+        <p:nvPr/>
+      </p:nvGrpSpPr>
+      <p:grpSpPr>
+        <a:xfrm>
+          <a:off x="0" y="0"/>
+          <a:ext cx="0" cy="0"/>
+          <a:chOff x="0" y="0"/>
+          <a:chExt cx="0" cy="0"/>
+        </a:xfrm>
+      </p:grpSpPr>
+      <p:sp>
+        <p:nvSpPr>
+          <p:cNvPr id="2" name="Title 1">
+            <a:extLst>
+              <a:ext uri="{FF2B5EF4-FFF2-40B4-BE49-F238E27FC236}">
+                <a16:creationId xmlns:a16="http://schemas.microsoft.com/office/drawing/2014/main" id="{7B4CA2AA-525E-5BE2-0184-48AA21EB572C}"/>
+              </a:ext>
+            </a:extLst>
+          </p:cNvPr>
+          <p:cNvSpPr>
+            <a:spLocks noGrp="1"/>
+          </p:cNvSpPr>
+          <p:nvPr>
+            <p:ph type="title"/>
+          </p:nvPr>
+        </p:nvSpPr>
+        <p:spPr/>
+        <p:txBody>
+          <a:bodyPr/>
+          <a:lstStyle/>
+          <a:p>
+            <a:r>
+              <a:rPr lang="en-US" dirty="0" err="1"/>
+              <a:t>Syntracker</a:t>
+            </a:r>
+            <a:endParaRPr lang="en-US" dirty="0"/>
+          </a:p>
+        </p:txBody>
+      </p:sp>
+      <p:sp>
+        <p:nvSpPr>
+          <p:cNvPr id="3" name="Content Placeholder 2">
+            <a:extLst>
+              <a:ext uri="{FF2B5EF4-FFF2-40B4-BE49-F238E27FC236}">
+                <a16:creationId xmlns:a16="http://schemas.microsoft.com/office/drawing/2014/main" id="{5593E409-81E8-D5F5-1DB8-69863541F0BF}"/>
+              </a:ext>
+            </a:extLst>
+          </p:cNvPr>
+          <p:cNvSpPr>
+            <a:spLocks noGrp="1"/>
+          </p:cNvSpPr>
+          <p:nvPr>
+            <p:ph idx="1"/>
+          </p:nvPr>
+        </p:nvSpPr>
+        <p:spPr/>
+        <p:txBody>
+          <a:bodyPr/>
+          <a:lstStyle/>
+          <a:p>
+            <a:r>
+              <a:rPr lang="en-US" dirty="0"/>
+              <a:t>By and large the </a:t>
+            </a:r>
+            <a:r>
+              <a:rPr lang="en-US" dirty="0" err="1"/>
+              <a:t>syntracker</a:t>
+            </a:r>
+            <a:r>
+              <a:rPr lang="en-US" dirty="0"/>
+              <a:t> results are not robust to different subsampling depths or assemblies, the results look similar at a genome wide level. This may indicate that there are only certain regions undergoing rearrangement </a:t>
+            </a:r>
+          </a:p>
+          <a:p>
+            <a:r>
+              <a:rPr lang="en-US" dirty="0"/>
+              <a:t>Some regions are shared between assemblers (that is they region </a:t>
+            </a:r>
+            <a:r>
+              <a:rPr lang="en-US" dirty="0" err="1"/>
+              <a:t>apsses</a:t>
+            </a:r>
+            <a:r>
+              <a:rPr lang="en-US" dirty="0"/>
+              <a:t> below the same strain cutoff. This could be due to technical reasons or biology. Not sure. </a:t>
+            </a:r>
+          </a:p>
+          <a:p>
+            <a:pPr marL="0" indent="0">
+              <a:buNone/>
+            </a:pPr>
+            <a:endParaRPr lang="en-US" dirty="0"/>
+          </a:p>
+        </p:txBody>
+      </p:sp>
+      <p:pic>
+        <p:nvPicPr>
+          <p:cNvPr id="5" name="Picture 4">
+            <a:extLst>
+              <a:ext uri="{FF2B5EF4-FFF2-40B4-BE49-F238E27FC236}">
+                <a16:creationId xmlns:a16="http://schemas.microsoft.com/office/drawing/2014/main" id="{0FD0E8DC-B5DB-6C2F-B5AE-809CB2114D5C}"/>
+              </a:ext>
+            </a:extLst>
+          </p:cNvPr>
+          <p:cNvPicPr>
+            <a:picLocks noChangeAspect="1"/>
+          </p:cNvPicPr>
+          <p:nvPr/>
+        </p:nvPicPr>
+        <p:blipFill>
+          <a:blip r:embed="rId2"/>
+          <a:stretch>
+            <a:fillRect/>
+          </a:stretch>
+        </p:blipFill>
+        <p:spPr>
+          <a:xfrm>
+            <a:off x="5682343" y="4276282"/>
+            <a:ext cx="5791200" cy="2302091"/>
+          </a:xfrm>
+          <a:prstGeom prst="rect">
+            <a:avLst/>
+          </a:prstGeom>
+        </p:spPr>
+      </p:pic>
+    </p:spTree>
+    <p:extLst>
+      <p:ext uri="{BB962C8B-B14F-4D97-AF65-F5344CB8AC3E}">
+        <p14:creationId xmlns:p14="http://schemas.microsoft.com/office/powerpoint/2010/main" val="1662246176"/>
       </p:ext>
     </p:extLst>
   </p:cSld>

</xml_diff>

<commit_message>
made script to convert prodigal genes calls to anvio external gene calls format
</commit_message>
<xml_diff>
--- a/pangenomicsAnalysis/pangenomics lab notebook.pptx
+++ b/pangenomicsAnalysis/pangenomics lab notebook.pptx
@@ -4,6 +4,9 @@
   <p:sldMasterIdLst>
     <p:sldMasterId id="2147483648" r:id="rId1"/>
   </p:sldMasterIdLst>
+  <p:notesMasterIdLst>
+    <p:notesMasterId r:id="rId9"/>
+  </p:notesMasterIdLst>
   <p:sldIdLst>
     <p:sldId id="256" r:id="rId2"/>
     <p:sldId id="257" r:id="rId3"/>
@@ -11,6 +14,7 @@
     <p:sldId id="259" r:id="rId5"/>
     <p:sldId id="260" r:id="rId6"/>
     <p:sldId id="261" r:id="rId7"/>
+    <p:sldId id="262" r:id="rId8"/>
   </p:sldIdLst>
   <p:sldSz cx="12192000" cy="6858000"/>
   <p:notesSz cx="6858000" cy="9144000"/>
@@ -115,6 +119,439 @@
     </p:ext>
   </p:extLst>
 </p:presentation>
+</file>
+
+<file path=ppt/notesMasters/notesMaster1.xml><?xml version="1.0" encoding="utf-8"?>
+<p:notesMaster xmlns:a="http://schemas.openxmlformats.org/drawingml/2006/main" xmlns:r="http://schemas.openxmlformats.org/officeDocument/2006/relationships" xmlns:p="http://schemas.openxmlformats.org/presentationml/2006/main">
+  <p:cSld>
+    <p:bg>
+      <p:bgRef idx="1001">
+        <a:schemeClr val="bg1"/>
+      </p:bgRef>
+    </p:bg>
+    <p:spTree>
+      <p:nvGrpSpPr>
+        <p:cNvPr id="1" name=""/>
+        <p:cNvGrpSpPr/>
+        <p:nvPr/>
+      </p:nvGrpSpPr>
+      <p:grpSpPr>
+        <a:xfrm>
+          <a:off x="0" y="0"/>
+          <a:ext cx="0" cy="0"/>
+          <a:chOff x="0" y="0"/>
+          <a:chExt cx="0" cy="0"/>
+        </a:xfrm>
+      </p:grpSpPr>
+      <p:sp>
+        <p:nvSpPr>
+          <p:cNvPr id="2" name="Header Placeholder 1"/>
+          <p:cNvSpPr>
+            <a:spLocks noGrp="1"/>
+          </p:cNvSpPr>
+          <p:nvPr>
+            <p:ph type="hdr" sz="quarter"/>
+          </p:nvPr>
+        </p:nvSpPr>
+        <p:spPr>
+          <a:xfrm>
+            <a:off x="0" y="0"/>
+            <a:ext cx="2971800" cy="458788"/>
+          </a:xfrm>
+          <a:prstGeom prst="rect">
+            <a:avLst/>
+          </a:prstGeom>
+        </p:spPr>
+        <p:txBody>
+          <a:bodyPr vert="horz" lIns="91440" tIns="45720" rIns="91440" bIns="45720" rtlCol="0"/>
+          <a:lstStyle>
+            <a:lvl1pPr algn="l">
+              <a:defRPr sz="1200"/>
+            </a:lvl1pPr>
+          </a:lstStyle>
+          <a:p>
+            <a:endParaRPr lang="en-US"/>
+          </a:p>
+        </p:txBody>
+      </p:sp>
+      <p:sp>
+        <p:nvSpPr>
+          <p:cNvPr id="3" name="Date Placeholder 2"/>
+          <p:cNvSpPr>
+            <a:spLocks noGrp="1"/>
+          </p:cNvSpPr>
+          <p:nvPr>
+            <p:ph type="dt" idx="1"/>
+          </p:nvPr>
+        </p:nvSpPr>
+        <p:spPr>
+          <a:xfrm>
+            <a:off x="3884613" y="0"/>
+            <a:ext cx="2971800" cy="458788"/>
+          </a:xfrm>
+          <a:prstGeom prst="rect">
+            <a:avLst/>
+          </a:prstGeom>
+        </p:spPr>
+        <p:txBody>
+          <a:bodyPr vert="horz" lIns="91440" tIns="45720" rIns="91440" bIns="45720" rtlCol="0"/>
+          <a:lstStyle>
+            <a:lvl1pPr algn="r">
+              <a:defRPr sz="1200"/>
+            </a:lvl1pPr>
+          </a:lstStyle>
+          <a:p>
+            <a:fld id="{8B7FEDCE-D4C6-1746-B5B2-5B154EA0FE38}" type="datetimeFigureOut">
+              <a:rPr lang="en-US" smtClean="0"/>
+              <a:t>1/8/25</a:t>
+            </a:fld>
+            <a:endParaRPr lang="en-US"/>
+          </a:p>
+        </p:txBody>
+      </p:sp>
+      <p:sp>
+        <p:nvSpPr>
+          <p:cNvPr id="4" name="Slide Image Placeholder 3"/>
+          <p:cNvSpPr>
+            <a:spLocks noGrp="1" noRot="1" noChangeAspect="1"/>
+          </p:cNvSpPr>
+          <p:nvPr>
+            <p:ph type="sldImg" idx="2"/>
+          </p:nvPr>
+        </p:nvSpPr>
+        <p:spPr>
+          <a:xfrm>
+            <a:off x="685800" y="1143000"/>
+            <a:ext cx="5486400" cy="3086100"/>
+          </a:xfrm>
+          <a:prstGeom prst="rect">
+            <a:avLst/>
+          </a:prstGeom>
+          <a:noFill/>
+          <a:ln w="12700">
+            <a:solidFill>
+              <a:prstClr val="black"/>
+            </a:solidFill>
+          </a:ln>
+        </p:spPr>
+        <p:txBody>
+          <a:bodyPr vert="horz" lIns="91440" tIns="45720" rIns="91440" bIns="45720" rtlCol="0" anchor="ctr"/>
+          <a:lstStyle/>
+          <a:p>
+            <a:endParaRPr lang="en-US"/>
+          </a:p>
+        </p:txBody>
+      </p:sp>
+      <p:sp>
+        <p:nvSpPr>
+          <p:cNvPr id="5" name="Notes Placeholder 4"/>
+          <p:cNvSpPr>
+            <a:spLocks noGrp="1"/>
+          </p:cNvSpPr>
+          <p:nvPr>
+            <p:ph type="body" sz="quarter" idx="3"/>
+          </p:nvPr>
+        </p:nvSpPr>
+        <p:spPr>
+          <a:xfrm>
+            <a:off x="685800" y="4400550"/>
+            <a:ext cx="5486400" cy="3600450"/>
+          </a:xfrm>
+          <a:prstGeom prst="rect">
+            <a:avLst/>
+          </a:prstGeom>
+        </p:spPr>
+        <p:txBody>
+          <a:bodyPr vert="horz" lIns="91440" tIns="45720" rIns="91440" bIns="45720" rtlCol="0"/>
+          <a:lstStyle/>
+          <a:p>
+            <a:pPr lvl="0"/>
+            <a:r>
+              <a:rPr lang="en-US"/>
+              <a:t>Click to edit Master text styles</a:t>
+            </a:r>
+          </a:p>
+          <a:p>
+            <a:pPr lvl="1"/>
+            <a:r>
+              <a:rPr lang="en-US"/>
+              <a:t>Second level</a:t>
+            </a:r>
+          </a:p>
+          <a:p>
+            <a:pPr lvl="2"/>
+            <a:r>
+              <a:rPr lang="en-US"/>
+              <a:t>Third level</a:t>
+            </a:r>
+          </a:p>
+          <a:p>
+            <a:pPr lvl="3"/>
+            <a:r>
+              <a:rPr lang="en-US"/>
+              <a:t>Fourth level</a:t>
+            </a:r>
+          </a:p>
+          <a:p>
+            <a:pPr lvl="4"/>
+            <a:r>
+              <a:rPr lang="en-US"/>
+              <a:t>Fifth level</a:t>
+            </a:r>
+          </a:p>
+        </p:txBody>
+      </p:sp>
+      <p:sp>
+        <p:nvSpPr>
+          <p:cNvPr id="6" name="Footer Placeholder 5"/>
+          <p:cNvSpPr>
+            <a:spLocks noGrp="1"/>
+          </p:cNvSpPr>
+          <p:nvPr>
+            <p:ph type="ftr" sz="quarter" idx="4"/>
+          </p:nvPr>
+        </p:nvSpPr>
+        <p:spPr>
+          <a:xfrm>
+            <a:off x="0" y="8685213"/>
+            <a:ext cx="2971800" cy="458787"/>
+          </a:xfrm>
+          <a:prstGeom prst="rect">
+            <a:avLst/>
+          </a:prstGeom>
+        </p:spPr>
+        <p:txBody>
+          <a:bodyPr vert="horz" lIns="91440" tIns="45720" rIns="91440" bIns="45720" rtlCol="0" anchor="b"/>
+          <a:lstStyle>
+            <a:lvl1pPr algn="l">
+              <a:defRPr sz="1200"/>
+            </a:lvl1pPr>
+          </a:lstStyle>
+          <a:p>
+            <a:endParaRPr lang="en-US"/>
+          </a:p>
+        </p:txBody>
+      </p:sp>
+      <p:sp>
+        <p:nvSpPr>
+          <p:cNvPr id="7" name="Slide Number Placeholder 6"/>
+          <p:cNvSpPr>
+            <a:spLocks noGrp="1"/>
+          </p:cNvSpPr>
+          <p:nvPr>
+            <p:ph type="sldNum" sz="quarter" idx="5"/>
+          </p:nvPr>
+        </p:nvSpPr>
+        <p:spPr>
+          <a:xfrm>
+            <a:off x="3884613" y="8685213"/>
+            <a:ext cx="2971800" cy="458787"/>
+          </a:xfrm>
+          <a:prstGeom prst="rect">
+            <a:avLst/>
+          </a:prstGeom>
+        </p:spPr>
+        <p:txBody>
+          <a:bodyPr vert="horz" lIns="91440" tIns="45720" rIns="91440" bIns="45720" rtlCol="0" anchor="b"/>
+          <a:lstStyle>
+            <a:lvl1pPr algn="r">
+              <a:defRPr sz="1200"/>
+            </a:lvl1pPr>
+          </a:lstStyle>
+          <a:p>
+            <a:fld id="{58F665B8-F216-9244-AA03-F7499778C651}" type="slidenum">
+              <a:rPr lang="en-US" smtClean="0"/>
+              <a:t>‹#›</a:t>
+            </a:fld>
+            <a:endParaRPr lang="en-US"/>
+          </a:p>
+        </p:txBody>
+      </p:sp>
+    </p:spTree>
+    <p:extLst>
+      <p:ext uri="{BB962C8B-B14F-4D97-AF65-F5344CB8AC3E}">
+        <p14:creationId xmlns:p14="http://schemas.microsoft.com/office/powerpoint/2010/main" val="433755135"/>
+      </p:ext>
+    </p:extLst>
+  </p:cSld>
+  <p:clrMap bg1="lt1" tx1="dk1" bg2="lt2" tx2="dk2" accent1="accent1" accent2="accent2" accent3="accent3" accent4="accent4" accent5="accent5" accent6="accent6" hlink="hlink" folHlink="folHlink"/>
+  <p:notesStyle>
+    <a:lvl1pPr marL="0" algn="l" defTabSz="914400" rtl="0" eaLnBrk="1" latinLnBrk="0" hangingPunct="1">
+      <a:defRPr sz="1200" kern="1200">
+        <a:solidFill>
+          <a:schemeClr val="tx1"/>
+        </a:solidFill>
+        <a:latin typeface="+mn-lt"/>
+        <a:ea typeface="+mn-ea"/>
+        <a:cs typeface="+mn-cs"/>
+      </a:defRPr>
+    </a:lvl1pPr>
+    <a:lvl2pPr marL="457200" algn="l" defTabSz="914400" rtl="0" eaLnBrk="1" latinLnBrk="0" hangingPunct="1">
+      <a:defRPr sz="1200" kern="1200">
+        <a:solidFill>
+          <a:schemeClr val="tx1"/>
+        </a:solidFill>
+        <a:latin typeface="+mn-lt"/>
+        <a:ea typeface="+mn-ea"/>
+        <a:cs typeface="+mn-cs"/>
+      </a:defRPr>
+    </a:lvl2pPr>
+    <a:lvl3pPr marL="914400" algn="l" defTabSz="914400" rtl="0" eaLnBrk="1" latinLnBrk="0" hangingPunct="1">
+      <a:defRPr sz="1200" kern="1200">
+        <a:solidFill>
+          <a:schemeClr val="tx1"/>
+        </a:solidFill>
+        <a:latin typeface="+mn-lt"/>
+        <a:ea typeface="+mn-ea"/>
+        <a:cs typeface="+mn-cs"/>
+      </a:defRPr>
+    </a:lvl3pPr>
+    <a:lvl4pPr marL="1371600" algn="l" defTabSz="914400" rtl="0" eaLnBrk="1" latinLnBrk="0" hangingPunct="1">
+      <a:defRPr sz="1200" kern="1200">
+        <a:solidFill>
+          <a:schemeClr val="tx1"/>
+        </a:solidFill>
+        <a:latin typeface="+mn-lt"/>
+        <a:ea typeface="+mn-ea"/>
+        <a:cs typeface="+mn-cs"/>
+      </a:defRPr>
+    </a:lvl4pPr>
+    <a:lvl5pPr marL="1828800" algn="l" defTabSz="914400" rtl="0" eaLnBrk="1" latinLnBrk="0" hangingPunct="1">
+      <a:defRPr sz="1200" kern="1200">
+        <a:solidFill>
+          <a:schemeClr val="tx1"/>
+        </a:solidFill>
+        <a:latin typeface="+mn-lt"/>
+        <a:ea typeface="+mn-ea"/>
+        <a:cs typeface="+mn-cs"/>
+      </a:defRPr>
+    </a:lvl5pPr>
+    <a:lvl6pPr marL="2286000" algn="l" defTabSz="914400" rtl="0" eaLnBrk="1" latinLnBrk="0" hangingPunct="1">
+      <a:defRPr sz="1200" kern="1200">
+        <a:solidFill>
+          <a:schemeClr val="tx1"/>
+        </a:solidFill>
+        <a:latin typeface="+mn-lt"/>
+        <a:ea typeface="+mn-ea"/>
+        <a:cs typeface="+mn-cs"/>
+      </a:defRPr>
+    </a:lvl6pPr>
+    <a:lvl7pPr marL="2743200" algn="l" defTabSz="914400" rtl="0" eaLnBrk="1" latinLnBrk="0" hangingPunct="1">
+      <a:defRPr sz="1200" kern="1200">
+        <a:solidFill>
+          <a:schemeClr val="tx1"/>
+        </a:solidFill>
+        <a:latin typeface="+mn-lt"/>
+        <a:ea typeface="+mn-ea"/>
+        <a:cs typeface="+mn-cs"/>
+      </a:defRPr>
+    </a:lvl7pPr>
+    <a:lvl8pPr marL="3200400" algn="l" defTabSz="914400" rtl="0" eaLnBrk="1" latinLnBrk="0" hangingPunct="1">
+      <a:defRPr sz="1200" kern="1200">
+        <a:solidFill>
+          <a:schemeClr val="tx1"/>
+        </a:solidFill>
+        <a:latin typeface="+mn-lt"/>
+        <a:ea typeface="+mn-ea"/>
+        <a:cs typeface="+mn-cs"/>
+      </a:defRPr>
+    </a:lvl8pPr>
+    <a:lvl9pPr marL="3657600" algn="l" defTabSz="914400" rtl="0" eaLnBrk="1" latinLnBrk="0" hangingPunct="1">
+      <a:defRPr sz="1200" kern="1200">
+        <a:solidFill>
+          <a:schemeClr val="tx1"/>
+        </a:solidFill>
+        <a:latin typeface="+mn-lt"/>
+        <a:ea typeface="+mn-ea"/>
+        <a:cs typeface="+mn-cs"/>
+      </a:defRPr>
+    </a:lvl9pPr>
+  </p:notesStyle>
+</p:notesMaster>
+</file>
+
+<file path=ppt/notesSlides/notesSlide1.xml><?xml version="1.0" encoding="utf-8"?>
+<p:notes xmlns:a="http://schemas.openxmlformats.org/drawingml/2006/main" xmlns:r="http://schemas.openxmlformats.org/officeDocument/2006/relationships" xmlns:p="http://schemas.openxmlformats.org/presentationml/2006/main">
+  <p:cSld>
+    <p:spTree>
+      <p:nvGrpSpPr>
+        <p:cNvPr id="1" name=""/>
+        <p:cNvGrpSpPr/>
+        <p:nvPr/>
+      </p:nvGrpSpPr>
+      <p:grpSpPr>
+        <a:xfrm>
+          <a:off x="0" y="0"/>
+          <a:ext cx="0" cy="0"/>
+          <a:chOff x="0" y="0"/>
+          <a:chExt cx="0" cy="0"/>
+        </a:xfrm>
+      </p:grpSpPr>
+      <p:sp>
+        <p:nvSpPr>
+          <p:cNvPr id="2" name="Slide Image Placeholder 1"/>
+          <p:cNvSpPr>
+            <a:spLocks noGrp="1" noRot="1" noChangeAspect="1"/>
+          </p:cNvSpPr>
+          <p:nvPr>
+            <p:ph type="sldImg"/>
+          </p:nvPr>
+        </p:nvSpPr>
+        <p:spPr/>
+      </p:sp>
+      <p:sp>
+        <p:nvSpPr>
+          <p:cNvPr id="3" name="Notes Placeholder 2"/>
+          <p:cNvSpPr>
+            <a:spLocks noGrp="1"/>
+          </p:cNvSpPr>
+          <p:nvPr>
+            <p:ph type="body" idx="1"/>
+          </p:nvPr>
+        </p:nvSpPr>
+        <p:spPr/>
+        <p:txBody>
+          <a:bodyPr/>
+          <a:lstStyle/>
+          <a:p>
+            <a:endParaRPr lang="en-US" dirty="0"/>
+          </a:p>
+        </p:txBody>
+      </p:sp>
+      <p:sp>
+        <p:nvSpPr>
+          <p:cNvPr id="4" name="Slide Number Placeholder 3"/>
+          <p:cNvSpPr>
+            <a:spLocks noGrp="1"/>
+          </p:cNvSpPr>
+          <p:nvPr>
+            <p:ph type="sldNum" sz="quarter" idx="5"/>
+          </p:nvPr>
+        </p:nvSpPr>
+        <p:spPr/>
+        <p:txBody>
+          <a:bodyPr/>
+          <a:lstStyle/>
+          <a:p>
+            <a:fld id="{58F665B8-F216-9244-AA03-F7499778C651}" type="slidenum">
+              <a:rPr lang="en-US" smtClean="0"/>
+              <a:t>6</a:t>
+            </a:fld>
+            <a:endParaRPr lang="en-US"/>
+          </a:p>
+        </p:txBody>
+      </p:sp>
+    </p:spTree>
+    <p:extLst>
+      <p:ext uri="{BB962C8B-B14F-4D97-AF65-F5344CB8AC3E}">
+        <p14:creationId xmlns:p14="http://schemas.microsoft.com/office/powerpoint/2010/main" val="858957966"/>
+      </p:ext>
+    </p:extLst>
+  </p:cSld>
+  <p:clrMapOvr>
+    <a:masterClrMapping/>
+  </p:clrMapOvr>
+</p:notes>
 </file>
 
 <file path=ppt/slideLayouts/slideLayout1.xml><?xml version="1.0" encoding="utf-8"?>
@@ -3892,7 +4329,12 @@
             <p:ph type="title"/>
           </p:nvPr>
         </p:nvSpPr>
-        <p:spPr/>
+        <p:spPr>
+          <a:xfrm>
+            <a:off x="838200" y="18255"/>
+            <a:ext cx="10515600" cy="1325563"/>
+          </a:xfrm>
+        </p:spPr>
         <p:txBody>
           <a:bodyPr/>
           <a:lstStyle/>
@@ -3921,7 +4363,12 @@
             <p:ph idx="1"/>
           </p:nvPr>
         </p:nvSpPr>
-        <p:spPr/>
+        <p:spPr>
+          <a:xfrm>
+            <a:off x="838200" y="1253331"/>
+            <a:ext cx="10515600" cy="4351338"/>
+          </a:xfrm>
+        </p:spPr>
         <p:txBody>
           <a:bodyPr/>
           <a:lstStyle/>
@@ -3976,14 +4423,14 @@
           <p:nvPr/>
         </p:nvPicPr>
         <p:blipFill>
-          <a:blip r:embed="rId2"/>
+          <a:blip r:embed="rId3"/>
           <a:stretch>
             <a:fillRect/>
           </a:stretch>
         </p:blipFill>
         <p:spPr>
           <a:xfrm>
-            <a:off x="5682343" y="4276282"/>
+            <a:off x="1175658" y="4183980"/>
             <a:ext cx="5791200" cy="2302091"/>
           </a:xfrm>
           <a:prstGeom prst="rect">
@@ -3995,6 +4442,154 @@
     <p:extLst>
       <p:ext uri="{BB962C8B-B14F-4D97-AF65-F5344CB8AC3E}">
         <p14:creationId xmlns:p14="http://schemas.microsoft.com/office/powerpoint/2010/main" val="1662246176"/>
+      </p:ext>
+    </p:extLst>
+  </p:cSld>
+  <p:clrMapOvr>
+    <a:masterClrMapping/>
+  </p:clrMapOvr>
+</p:sld>
+</file>
+
+<file path=ppt/slides/slide7.xml><?xml version="1.0" encoding="utf-8"?>
+<p:sld xmlns:a="http://schemas.openxmlformats.org/drawingml/2006/main" xmlns:r="http://schemas.openxmlformats.org/officeDocument/2006/relationships" xmlns:p="http://schemas.openxmlformats.org/presentationml/2006/main">
+  <p:cSld>
+    <p:spTree>
+      <p:nvGrpSpPr>
+        <p:cNvPr id="1" name=""/>
+        <p:cNvGrpSpPr/>
+        <p:nvPr/>
+      </p:nvGrpSpPr>
+      <p:grpSpPr>
+        <a:xfrm>
+          <a:off x="0" y="0"/>
+          <a:ext cx="0" cy="0"/>
+          <a:chOff x="0" y="0"/>
+          <a:chExt cx="0" cy="0"/>
+        </a:xfrm>
+      </p:grpSpPr>
+      <p:sp>
+        <p:nvSpPr>
+          <p:cNvPr id="2" name="Title 1">
+            <a:extLst>
+              <a:ext uri="{FF2B5EF4-FFF2-40B4-BE49-F238E27FC236}">
+                <a16:creationId xmlns:a16="http://schemas.microsoft.com/office/drawing/2014/main" id="{429D66F9-105C-FD23-E668-2D98FB1B5114}"/>
+              </a:ext>
+            </a:extLst>
+          </p:cNvPr>
+          <p:cNvSpPr>
+            <a:spLocks noGrp="1"/>
+          </p:cNvSpPr>
+          <p:nvPr>
+            <p:ph type="title"/>
+          </p:nvPr>
+        </p:nvSpPr>
+        <p:spPr/>
+        <p:txBody>
+          <a:bodyPr/>
+          <a:lstStyle/>
+          <a:p>
+            <a:r>
+              <a:rPr lang="en-US" dirty="0"/>
+              <a:t>Checking binning process (metabat2)</a:t>
+            </a:r>
+          </a:p>
+        </p:txBody>
+      </p:sp>
+      <p:sp>
+        <p:nvSpPr>
+          <p:cNvPr id="3" name="Content Placeholder 2">
+            <a:extLst>
+              <a:ext uri="{FF2B5EF4-FFF2-40B4-BE49-F238E27FC236}">
+                <a16:creationId xmlns:a16="http://schemas.microsoft.com/office/drawing/2014/main" id="{81D70B7A-E1B7-FF57-B6D2-CBB75CE30B62}"/>
+              </a:ext>
+            </a:extLst>
+          </p:cNvPr>
+          <p:cNvSpPr>
+            <a:spLocks noGrp="1"/>
+          </p:cNvSpPr>
+          <p:nvPr>
+            <p:ph idx="1"/>
+          </p:nvPr>
+        </p:nvSpPr>
+        <p:spPr/>
+        <p:txBody>
+          <a:bodyPr/>
+          <a:lstStyle/>
+          <a:p>
+            <a:r>
+              <a:rPr lang="en-US" dirty="0"/>
+              <a:t>Binnig with the </a:t>
+            </a:r>
+            <a:r>
+              <a:rPr lang="en-US" dirty="0" err="1"/>
+              <a:t>anvi</a:t>
+            </a:r>
+            <a:r>
+              <a:rPr lang="en-US" dirty="0"/>
+              <a:t> </a:t>
+            </a:r>
+            <a:r>
+              <a:rPr lang="en-US" dirty="0" err="1"/>
+              <a:t>converage</a:t>
+            </a:r>
+            <a:r>
+              <a:rPr lang="en-US" dirty="0"/>
+              <a:t> produces smaller (and likely worse bins) </a:t>
+            </a:r>
+          </a:p>
+          <a:p>
+            <a:r>
+              <a:rPr lang="en-US" dirty="0"/>
+              <a:t>Standard output: </a:t>
+            </a:r>
+          </a:p>
+          <a:p>
+            <a:pPr lvl="1"/>
+            <a:r>
+              <a:rPr lang="en-US" dirty="0"/>
+              <a:t>2 bins (2,333,080 bases in total) formed. (standard output)</a:t>
+            </a:r>
+          </a:p>
+          <a:p>
+            <a:r>
+              <a:rPr lang="en-US" dirty="0"/>
+              <a:t>Using </a:t>
+            </a:r>
+            <a:r>
+              <a:rPr lang="en-US" dirty="0" err="1"/>
+              <a:t>anvio</a:t>
+            </a:r>
+            <a:r>
+              <a:rPr lang="en-US" dirty="0"/>
+              <a:t> supplied coverage file </a:t>
+            </a:r>
+          </a:p>
+          <a:p>
+            <a:pPr lvl="1"/>
+            <a:r>
+              <a:rPr lang="en-US" dirty="0"/>
+              <a:t>2 bins (2,141,101 bases in total) formed.</a:t>
+            </a:r>
+          </a:p>
+          <a:p>
+            <a:r>
+              <a:rPr lang="en-US" dirty="0"/>
+              <a:t>Updating pipeline to include this step</a:t>
+            </a:r>
+          </a:p>
+          <a:p>
+            <a:pPr marL="457200" lvl="1" indent="0">
+              <a:buNone/>
+            </a:pPr>
+            <a:endParaRPr lang="en-US" dirty="0"/>
+          </a:p>
+        </p:txBody>
+      </p:sp>
+    </p:spTree>
+    <p:extLst>
+      <p:ext uri="{BB962C8B-B14F-4D97-AF65-F5344CB8AC3E}">
+        <p14:creationId xmlns:p14="http://schemas.microsoft.com/office/powerpoint/2010/main" val="2329166889"/>
       </p:ext>
     </p:extLst>
   </p:cSld>
@@ -4317,4 +4912,319 @@
     </a:ext>
   </a:extLst>
 </a:theme>
+</file>
+
+<file path=ppt/theme/theme2.xml><?xml version="1.0" encoding="utf-8"?>
+<a:theme xmlns:a="http://schemas.openxmlformats.org/drawingml/2006/main" name="Office Theme">
+  <a:themeElements>
+    <a:clrScheme name="Office">
+      <a:dk1>
+        <a:sysClr val="windowText" lastClr="000000"/>
+      </a:dk1>
+      <a:lt1>
+        <a:sysClr val="window" lastClr="FFFFFF"/>
+      </a:lt1>
+      <a:dk2>
+        <a:srgbClr val="0E2841"/>
+      </a:dk2>
+      <a:lt2>
+        <a:srgbClr val="E8E8E8"/>
+      </a:lt2>
+      <a:accent1>
+        <a:srgbClr val="156082"/>
+      </a:accent1>
+      <a:accent2>
+        <a:srgbClr val="E97132"/>
+      </a:accent2>
+      <a:accent3>
+        <a:srgbClr val="196B24"/>
+      </a:accent3>
+      <a:accent4>
+        <a:srgbClr val="0F9ED5"/>
+      </a:accent4>
+      <a:accent5>
+        <a:srgbClr val="A02B93"/>
+      </a:accent5>
+      <a:accent6>
+        <a:srgbClr val="4EA72E"/>
+      </a:accent6>
+      <a:hlink>
+        <a:srgbClr val="467886"/>
+      </a:hlink>
+      <a:folHlink>
+        <a:srgbClr val="96607D"/>
+      </a:folHlink>
+    </a:clrScheme>
+    <a:fontScheme name="Office">
+      <a:majorFont>
+        <a:latin typeface="Aptos Display" panose="02110004020202020204"/>
+        <a:ea typeface=""/>
+        <a:cs typeface=""/>
+        <a:font script="Jpan" typeface="游ゴシック Light"/>
+        <a:font script="Hang" typeface="맑은 고딕"/>
+        <a:font script="Hans" typeface="等线 Light"/>
+        <a:font script="Hant" typeface="新細明體"/>
+        <a:font script="Arab" typeface="Times New Roman"/>
+        <a:font script="Hebr" typeface="Times New Roman"/>
+        <a:font script="Thai" typeface="Angsana New"/>
+        <a:font script="Ethi" typeface="Nyala"/>
+        <a:font script="Beng" typeface="Vrinda"/>
+        <a:font script="Gujr" typeface="Shruti"/>
+        <a:font script="Khmr" typeface="MoolBoran"/>
+        <a:font script="Knda" typeface="Tunga"/>
+        <a:font script="Guru" typeface="Raavi"/>
+        <a:font script="Cans" typeface="Euphemia"/>
+        <a:font script="Cher" typeface="Plantagenet Cherokee"/>
+        <a:font script="Yiii" typeface="Microsoft Yi Baiti"/>
+        <a:font script="Tibt" typeface="Microsoft Himalaya"/>
+        <a:font script="Thaa" typeface="MV Boli"/>
+        <a:font script="Deva" typeface="Mangal"/>
+        <a:font script="Telu" typeface="Gautami"/>
+        <a:font script="Taml" typeface="Latha"/>
+        <a:font script="Syrc" typeface="Estrangelo Edessa"/>
+        <a:font script="Orya" typeface="Kalinga"/>
+        <a:font script="Mlym" typeface="Kartika"/>
+        <a:font script="Laoo" typeface="DokChampa"/>
+        <a:font script="Sinh" typeface="Iskoola Pota"/>
+        <a:font script="Mong" typeface="Mongolian Baiti"/>
+        <a:font script="Viet" typeface="Times New Roman"/>
+        <a:font script="Uigh" typeface="Microsoft Uighur"/>
+        <a:font script="Geor" typeface="Sylfaen"/>
+        <a:font script="Armn" typeface="Arial"/>
+        <a:font script="Bugi" typeface="Leelawadee UI"/>
+        <a:font script="Bopo" typeface="Microsoft JhengHei"/>
+        <a:font script="Java" typeface="Javanese Text"/>
+        <a:font script="Lisu" typeface="Segoe UI"/>
+        <a:font script="Mymr" typeface="Myanmar Text"/>
+        <a:font script="Nkoo" typeface="Ebrima"/>
+        <a:font script="Olck" typeface="Nirmala UI"/>
+        <a:font script="Osma" typeface="Ebrima"/>
+        <a:font script="Phag" typeface="Phagspa"/>
+        <a:font script="Syrn" typeface="Estrangelo Edessa"/>
+        <a:font script="Syrj" typeface="Estrangelo Edessa"/>
+        <a:font script="Syre" typeface="Estrangelo Edessa"/>
+        <a:font script="Sora" typeface="Nirmala UI"/>
+        <a:font script="Tale" typeface="Microsoft Tai Le"/>
+        <a:font script="Talu" typeface="Microsoft New Tai Lue"/>
+        <a:font script="Tfng" typeface="Ebrima"/>
+      </a:majorFont>
+      <a:minorFont>
+        <a:latin typeface="Aptos" panose="02110004020202020204"/>
+        <a:ea typeface=""/>
+        <a:cs typeface=""/>
+        <a:font script="Jpan" typeface="游ゴシック"/>
+        <a:font script="Hang" typeface="맑은 고딕"/>
+        <a:font script="Hans" typeface="等线"/>
+        <a:font script="Hant" typeface="新細明體"/>
+        <a:font script="Arab" typeface="Arial"/>
+        <a:font script="Hebr" typeface="Arial"/>
+        <a:font script="Thai" typeface="Cordia New"/>
+        <a:font script="Ethi" typeface="Nyala"/>
+        <a:font script="Beng" typeface="Vrinda"/>
+        <a:font script="Gujr" typeface="Shruti"/>
+        <a:font script="Khmr" typeface="DaunPenh"/>
+        <a:font script="Knda" typeface="Tunga"/>
+        <a:font script="Guru" typeface="Raavi"/>
+        <a:font script="Cans" typeface="Euphemia"/>
+        <a:font script="Cher" typeface="Plantagenet Cherokee"/>
+        <a:font script="Yiii" typeface="Microsoft Yi Baiti"/>
+        <a:font script="Tibt" typeface="Microsoft Himalaya"/>
+        <a:font script="Thaa" typeface="MV Boli"/>
+        <a:font script="Deva" typeface="Mangal"/>
+        <a:font script="Telu" typeface="Gautami"/>
+        <a:font script="Taml" typeface="Latha"/>
+        <a:font script="Syrc" typeface="Estrangelo Edessa"/>
+        <a:font script="Orya" typeface="Kalinga"/>
+        <a:font script="Mlym" typeface="Kartika"/>
+        <a:font script="Laoo" typeface="DokChampa"/>
+        <a:font script="Sinh" typeface="Iskoola Pota"/>
+        <a:font script="Mong" typeface="Mongolian Baiti"/>
+        <a:font script="Viet" typeface="Arial"/>
+        <a:font script="Uigh" typeface="Microsoft Uighur"/>
+        <a:font script="Geor" typeface="Sylfaen"/>
+        <a:font script="Armn" typeface="Arial"/>
+        <a:font script="Bugi" typeface="Leelawadee UI"/>
+        <a:font script="Bopo" typeface="Microsoft JhengHei"/>
+        <a:font script="Java" typeface="Javanese Text"/>
+        <a:font script="Lisu" typeface="Segoe UI"/>
+        <a:font script="Mymr" typeface="Myanmar Text"/>
+        <a:font script="Nkoo" typeface="Ebrima"/>
+        <a:font script="Olck" typeface="Nirmala UI"/>
+        <a:font script="Osma" typeface="Ebrima"/>
+        <a:font script="Phag" typeface="Phagspa"/>
+        <a:font script="Syrn" typeface="Estrangelo Edessa"/>
+        <a:font script="Syrj" typeface="Estrangelo Edessa"/>
+        <a:font script="Syre" typeface="Estrangelo Edessa"/>
+        <a:font script="Sora" typeface="Nirmala UI"/>
+        <a:font script="Tale" typeface="Microsoft Tai Le"/>
+        <a:font script="Talu" typeface="Microsoft New Tai Lue"/>
+        <a:font script="Tfng" typeface="Ebrima"/>
+      </a:minorFont>
+    </a:fontScheme>
+    <a:fmtScheme name="Office">
+      <a:fillStyleLst>
+        <a:solidFill>
+          <a:schemeClr val="phClr"/>
+        </a:solidFill>
+        <a:gradFill rotWithShape="1">
+          <a:gsLst>
+            <a:gs pos="0">
+              <a:schemeClr val="phClr">
+                <a:lumMod val="110000"/>
+                <a:satMod val="105000"/>
+                <a:tint val="67000"/>
+              </a:schemeClr>
+            </a:gs>
+            <a:gs pos="50000">
+              <a:schemeClr val="phClr">
+                <a:lumMod val="105000"/>
+                <a:satMod val="103000"/>
+                <a:tint val="73000"/>
+              </a:schemeClr>
+            </a:gs>
+            <a:gs pos="100000">
+              <a:schemeClr val="phClr">
+                <a:lumMod val="105000"/>
+                <a:satMod val="109000"/>
+                <a:tint val="81000"/>
+              </a:schemeClr>
+            </a:gs>
+          </a:gsLst>
+          <a:lin ang="5400000" scaled="0"/>
+        </a:gradFill>
+        <a:gradFill rotWithShape="1">
+          <a:gsLst>
+            <a:gs pos="0">
+              <a:schemeClr val="phClr">
+                <a:satMod val="103000"/>
+                <a:lumMod val="102000"/>
+                <a:tint val="94000"/>
+              </a:schemeClr>
+            </a:gs>
+            <a:gs pos="50000">
+              <a:schemeClr val="phClr">
+                <a:satMod val="110000"/>
+                <a:lumMod val="100000"/>
+                <a:shade val="100000"/>
+              </a:schemeClr>
+            </a:gs>
+            <a:gs pos="100000">
+              <a:schemeClr val="phClr">
+                <a:lumMod val="99000"/>
+                <a:satMod val="120000"/>
+                <a:shade val="78000"/>
+              </a:schemeClr>
+            </a:gs>
+          </a:gsLst>
+          <a:lin ang="5400000" scaled="0"/>
+        </a:gradFill>
+      </a:fillStyleLst>
+      <a:lnStyleLst>
+        <a:ln w="12700" cap="flat" cmpd="sng" algn="ctr">
+          <a:solidFill>
+            <a:schemeClr val="phClr"/>
+          </a:solidFill>
+          <a:prstDash val="solid"/>
+          <a:miter lim="800000"/>
+        </a:ln>
+        <a:ln w="19050" cap="flat" cmpd="sng" algn="ctr">
+          <a:solidFill>
+            <a:schemeClr val="phClr"/>
+          </a:solidFill>
+          <a:prstDash val="solid"/>
+          <a:miter lim="800000"/>
+        </a:ln>
+        <a:ln w="25400" cap="flat" cmpd="sng" algn="ctr">
+          <a:solidFill>
+            <a:schemeClr val="phClr"/>
+          </a:solidFill>
+          <a:prstDash val="solid"/>
+          <a:miter lim="800000"/>
+        </a:ln>
+      </a:lnStyleLst>
+      <a:effectStyleLst>
+        <a:effectStyle>
+          <a:effectLst/>
+        </a:effectStyle>
+        <a:effectStyle>
+          <a:effectLst/>
+        </a:effectStyle>
+        <a:effectStyle>
+          <a:effectLst>
+            <a:outerShdw blurRad="57150" dist="19050" dir="5400000" algn="ctr" rotWithShape="0">
+              <a:srgbClr val="000000">
+                <a:alpha val="63000"/>
+              </a:srgbClr>
+            </a:outerShdw>
+          </a:effectLst>
+        </a:effectStyle>
+      </a:effectStyleLst>
+      <a:bgFillStyleLst>
+        <a:solidFill>
+          <a:schemeClr val="phClr"/>
+        </a:solidFill>
+        <a:solidFill>
+          <a:schemeClr val="phClr">
+            <a:tint val="95000"/>
+            <a:satMod val="170000"/>
+          </a:schemeClr>
+        </a:solidFill>
+        <a:gradFill rotWithShape="1">
+          <a:gsLst>
+            <a:gs pos="0">
+              <a:schemeClr val="phClr">
+                <a:tint val="93000"/>
+                <a:satMod val="150000"/>
+                <a:shade val="98000"/>
+                <a:lumMod val="102000"/>
+              </a:schemeClr>
+            </a:gs>
+            <a:gs pos="50000">
+              <a:schemeClr val="phClr">
+                <a:tint val="98000"/>
+                <a:satMod val="130000"/>
+                <a:shade val="90000"/>
+                <a:lumMod val="103000"/>
+              </a:schemeClr>
+            </a:gs>
+            <a:gs pos="100000">
+              <a:schemeClr val="phClr">
+                <a:shade val="63000"/>
+                <a:satMod val="120000"/>
+              </a:schemeClr>
+            </a:gs>
+          </a:gsLst>
+          <a:lin ang="5400000" scaled="0"/>
+        </a:gradFill>
+      </a:bgFillStyleLst>
+    </a:fmtScheme>
+  </a:themeElements>
+  <a:objectDefaults>
+    <a:lnDef>
+      <a:spPr/>
+      <a:bodyPr/>
+      <a:lstStyle/>
+      <a:style>
+        <a:lnRef idx="2">
+          <a:schemeClr val="accent1"/>
+        </a:lnRef>
+        <a:fillRef idx="0">
+          <a:schemeClr val="accent1"/>
+        </a:fillRef>
+        <a:effectRef idx="1">
+          <a:schemeClr val="accent1"/>
+        </a:effectRef>
+        <a:fontRef idx="minor">
+          <a:schemeClr val="tx1"/>
+        </a:fontRef>
+      </a:style>
+    </a:lnDef>
+  </a:objectDefaults>
+  <a:extraClrSchemeLst/>
+  <a:extLst>
+    <a:ext uri="{05A4C25C-085E-4340-85A3-A5531E510DB2}">
+      <thm15:themeFamily xmlns:thm15="http://schemas.microsoft.com/office/thememl/2012/main" name="Office Theme" id="{2E142A2C-CD16-42D6-873A-C26D2A0506FA}" vid="{1BDDFF52-6CD6-40A5-AB3C-68EB2F1E4D0A}"/>
+    </a:ext>
+  </a:extLst>
+</a:theme>
 </file>
</xml_diff>